<commit_message>
Added notes extraction feature for PPTX
</commit_message>
<xml_diff>
--- a/spec/fixtures/sample.pptx
+++ b/spec/fixtures/sample.pptx
@@ -193,7 +193,8 @@
           <a:p>
             <a:fld id="{BAF27077-FDD4-4CA2-B78A-682A79CC5E24}" type="datetimeFigureOut">
               <a:rPr lang="en-US" smtClean="0"/>
-              <a:t>3/7/2014</a:t>
+              <a:pPr/>
+              <a:t>11/29/2015</a:t>
             </a:fld>
             <a:endParaRPr lang="en-US"/>
           </a:p>
@@ -352,6 +353,7 @@
           <a:p>
             <a:fld id="{57CC1283-2BDC-4B6C-9D1B-A9444AB93783}" type="slidenum">
               <a:rPr lang="en-US" smtClean="0"/>
+              <a:pPr/>
               <a:t>‹#›</a:t>
             </a:fld>
             <a:endParaRPr lang="en-US"/>
@@ -361,7 +363,7 @@
     </p:spTree>
     <p:extLst>
       <p:ext uri="{BB962C8B-B14F-4D97-AF65-F5344CB8AC3E}">
-        <p14:creationId xmlns:p14="http://schemas.microsoft.com/office/powerpoint/2010/main" val="1450353660"/>
+        <p14:creationId xmlns:p14="http://schemas.microsoft.com/office/powerpoint/2010/main" xmlns="" val="1450353660"/>
       </p:ext>
     </p:extLst>
   </p:cSld>
@@ -502,6 +504,108 @@
         </p:nvSpPr>
         <p:spPr/>
         <p:txBody>
+          <a:bodyPr>
+            <a:normAutofit/>
+          </a:bodyPr>
+          <a:lstStyle/>
+          <a:p>
+            <a:r>
+              <a:rPr lang="en-IN" dirty="0" smtClean="0"/>
+              <a:t>Testing</a:t>
+            </a:r>
+            <a:r>
+              <a:rPr lang="en-IN" baseline="0" dirty="0" smtClean="0"/>
+              <a:t> Multiline Notes.</a:t>
+            </a:r>
+          </a:p>
+          <a:p>
+            <a:r>
+              <a:rPr lang="en-IN" baseline="0" dirty="0" smtClean="0"/>
+              <a:t>To be extracted here.</a:t>
+            </a:r>
+          </a:p>
+          <a:p>
+            <a:r>
+              <a:rPr lang="en-IN" baseline="0" smtClean="0"/>
+              <a:t>Multiline notes extracted.</a:t>
+            </a:r>
+            <a:endParaRPr lang="en-IN" dirty="0"/>
+          </a:p>
+        </p:txBody>
+      </p:sp>
+      <p:sp>
+        <p:nvSpPr>
+          <p:cNvPr id="4" name="Slide Number Placeholder 3"/>
+          <p:cNvSpPr>
+            <a:spLocks noGrp="1"/>
+          </p:cNvSpPr>
+          <p:nvPr>
+            <p:ph type="sldNum" sz="quarter" idx="10"/>
+          </p:nvPr>
+        </p:nvSpPr>
+        <p:spPr/>
+        <p:txBody>
+          <a:bodyPr/>
+          <a:lstStyle/>
+          <a:p>
+            <a:fld id="{57CC1283-2BDC-4B6C-9D1B-A9444AB93783}" type="slidenum">
+              <a:rPr lang="en-US" smtClean="0"/>
+              <a:pPr/>
+              <a:t>1</a:t>
+            </a:fld>
+            <a:endParaRPr lang="en-US"/>
+          </a:p>
+        </p:txBody>
+      </p:sp>
+    </p:spTree>
+  </p:cSld>
+  <p:clrMapOvr>
+    <a:masterClrMapping/>
+  </p:clrMapOvr>
+</p:notes>
+</file>
+
+<file path=ppt/notesSlides/notesSlide2.xml><?xml version="1.0" encoding="utf-8"?>
+<p:notes xmlns:a="http://schemas.openxmlformats.org/drawingml/2006/main" xmlns:r="http://schemas.openxmlformats.org/officeDocument/2006/relationships" xmlns:p="http://schemas.openxmlformats.org/presentationml/2006/main">
+  <p:cSld>
+    <p:spTree>
+      <p:nvGrpSpPr>
+        <p:cNvPr id="1" name=""/>
+        <p:cNvGrpSpPr/>
+        <p:nvPr/>
+      </p:nvGrpSpPr>
+      <p:grpSpPr>
+        <a:xfrm>
+          <a:off x="0" y="0"/>
+          <a:ext cx="0" cy="0"/>
+          <a:chOff x="0" y="0"/>
+          <a:chExt cx="0" cy="0"/>
+        </a:xfrm>
+      </p:grpSpPr>
+      <p:sp>
+        <p:nvSpPr>
+          <p:cNvPr id="2" name="Slide Image Placeholder 1"/>
+          <p:cNvSpPr>
+            <a:spLocks noGrp="1" noRot="1" noChangeAspect="1"/>
+          </p:cNvSpPr>
+          <p:nvPr>
+            <p:ph type="sldImg"/>
+          </p:nvPr>
+        </p:nvSpPr>
+        <p:spPr/>
+      </p:sp>
+      <p:sp>
+        <p:nvSpPr>
+          <p:cNvPr id="3" name="Notes Placeholder 2"/>
+          <p:cNvSpPr>
+            <a:spLocks noGrp="1"/>
+          </p:cNvSpPr>
+          <p:nvPr>
+            <p:ph type="body" idx="1"/>
+          </p:nvPr>
+        </p:nvSpPr>
+        <p:spPr/>
+        <p:txBody>
           <a:bodyPr/>
           <a:lstStyle/>
           <a:p>
@@ -526,6 +630,7 @@
           <a:p>
             <a:fld id="{57CC1283-2BDC-4B6C-9D1B-A9444AB93783}" type="slidenum">
               <a:rPr lang="en-US" smtClean="0"/>
+              <a:pPr/>
               <a:t>2</a:t>
             </a:fld>
             <a:endParaRPr lang="en-US"/>
@@ -535,7 +640,7 @@
     </p:spTree>
     <p:extLst>
       <p:ext uri="{BB962C8B-B14F-4D97-AF65-F5344CB8AC3E}">
-        <p14:creationId xmlns:p14="http://schemas.microsoft.com/office/powerpoint/2010/main" val="1448419716"/>
+        <p14:creationId xmlns:p14="http://schemas.microsoft.com/office/powerpoint/2010/main" xmlns="" val="1448419716"/>
       </p:ext>
     </p:extLst>
   </p:cSld>
@@ -726,7 +831,8 @@
           <a:p>
             <a:fld id="{E7A90B90-E472-474B-A3B5-1621A993C8E6}" type="datetimeFigureOut">
               <a:rPr lang="en-US" smtClean="0"/>
-              <a:t>3/7/2014</a:t>
+              <a:pPr/>
+              <a:t>11/29/2015</a:t>
             </a:fld>
             <a:endParaRPr lang="en-US"/>
           </a:p>
@@ -768,6 +874,7 @@
           <a:p>
             <a:fld id="{BE42A63D-5A36-4046-B938-53CC6422AE08}" type="slidenum">
               <a:rPr lang="en-US" smtClean="0"/>
+              <a:pPr/>
               <a:t>‹#›</a:t>
             </a:fld>
             <a:endParaRPr lang="en-US"/>
@@ -777,7 +884,7 @@
     </p:spTree>
     <p:extLst>
       <p:ext uri="{BB962C8B-B14F-4D97-AF65-F5344CB8AC3E}">
-        <p14:creationId xmlns:p14="http://schemas.microsoft.com/office/powerpoint/2010/main" val="1146942130"/>
+        <p14:creationId xmlns:p14="http://schemas.microsoft.com/office/powerpoint/2010/main" xmlns="" val="1146942130"/>
       </p:ext>
     </p:extLst>
   </p:cSld>
@@ -896,7 +1003,8 @@
           <a:p>
             <a:fld id="{E7A90B90-E472-474B-A3B5-1621A993C8E6}" type="datetimeFigureOut">
               <a:rPr lang="en-US" smtClean="0"/>
-              <a:t>3/7/2014</a:t>
+              <a:pPr/>
+              <a:t>11/29/2015</a:t>
             </a:fld>
             <a:endParaRPr lang="en-US"/>
           </a:p>
@@ -938,6 +1046,7 @@
           <a:p>
             <a:fld id="{BE42A63D-5A36-4046-B938-53CC6422AE08}" type="slidenum">
               <a:rPr lang="en-US" smtClean="0"/>
+              <a:pPr/>
               <a:t>‹#›</a:t>
             </a:fld>
             <a:endParaRPr lang="en-US"/>
@@ -947,7 +1056,7 @@
     </p:spTree>
     <p:extLst>
       <p:ext uri="{BB962C8B-B14F-4D97-AF65-F5344CB8AC3E}">
-        <p14:creationId xmlns:p14="http://schemas.microsoft.com/office/powerpoint/2010/main" val="937916889"/>
+        <p14:creationId xmlns:p14="http://schemas.microsoft.com/office/powerpoint/2010/main" xmlns="" val="937916889"/>
       </p:ext>
     </p:extLst>
   </p:cSld>
@@ -1076,7 +1185,8 @@
           <a:p>
             <a:fld id="{E7A90B90-E472-474B-A3B5-1621A993C8E6}" type="datetimeFigureOut">
               <a:rPr lang="en-US" smtClean="0"/>
-              <a:t>3/7/2014</a:t>
+              <a:pPr/>
+              <a:t>11/29/2015</a:t>
             </a:fld>
             <a:endParaRPr lang="en-US"/>
           </a:p>
@@ -1118,6 +1228,7 @@
           <a:p>
             <a:fld id="{BE42A63D-5A36-4046-B938-53CC6422AE08}" type="slidenum">
               <a:rPr lang="en-US" smtClean="0"/>
+              <a:pPr/>
               <a:t>‹#›</a:t>
             </a:fld>
             <a:endParaRPr lang="en-US"/>
@@ -1127,7 +1238,7 @@
     </p:spTree>
     <p:extLst>
       <p:ext uri="{BB962C8B-B14F-4D97-AF65-F5344CB8AC3E}">
-        <p14:creationId xmlns:p14="http://schemas.microsoft.com/office/powerpoint/2010/main" val="1477047430"/>
+        <p14:creationId xmlns:p14="http://schemas.microsoft.com/office/powerpoint/2010/main" xmlns="" val="1477047430"/>
       </p:ext>
     </p:extLst>
   </p:cSld>
@@ -1246,7 +1357,8 @@
           <a:p>
             <a:fld id="{E7A90B90-E472-474B-A3B5-1621A993C8E6}" type="datetimeFigureOut">
               <a:rPr lang="en-US" smtClean="0"/>
-              <a:t>3/7/2014</a:t>
+              <a:pPr/>
+              <a:t>11/29/2015</a:t>
             </a:fld>
             <a:endParaRPr lang="en-US"/>
           </a:p>
@@ -1288,6 +1400,7 @@
           <a:p>
             <a:fld id="{BE42A63D-5A36-4046-B938-53CC6422AE08}" type="slidenum">
               <a:rPr lang="en-US" smtClean="0"/>
+              <a:pPr/>
               <a:t>‹#›</a:t>
             </a:fld>
             <a:endParaRPr lang="en-US"/>
@@ -1297,7 +1410,7 @@
     </p:spTree>
     <p:extLst>
       <p:ext uri="{BB962C8B-B14F-4D97-AF65-F5344CB8AC3E}">
-        <p14:creationId xmlns:p14="http://schemas.microsoft.com/office/powerpoint/2010/main" val="501105856"/>
+        <p14:creationId xmlns:p14="http://schemas.microsoft.com/office/powerpoint/2010/main" xmlns="" val="501105856"/>
       </p:ext>
     </p:extLst>
   </p:cSld>
@@ -1492,7 +1605,8 @@
           <a:p>
             <a:fld id="{E7A90B90-E472-474B-A3B5-1621A993C8E6}" type="datetimeFigureOut">
               <a:rPr lang="en-US" smtClean="0"/>
-              <a:t>3/7/2014</a:t>
+              <a:pPr/>
+              <a:t>11/29/2015</a:t>
             </a:fld>
             <a:endParaRPr lang="en-US"/>
           </a:p>
@@ -1534,6 +1648,7 @@
           <a:p>
             <a:fld id="{BE42A63D-5A36-4046-B938-53CC6422AE08}" type="slidenum">
               <a:rPr lang="en-US" smtClean="0"/>
+              <a:pPr/>
               <a:t>‹#›</a:t>
             </a:fld>
             <a:endParaRPr lang="en-US"/>
@@ -1543,7 +1658,7 @@
     </p:spTree>
     <p:extLst>
       <p:ext uri="{BB962C8B-B14F-4D97-AF65-F5344CB8AC3E}">
-        <p14:creationId xmlns:p14="http://schemas.microsoft.com/office/powerpoint/2010/main" val="2326384349"/>
+        <p14:creationId xmlns:p14="http://schemas.microsoft.com/office/powerpoint/2010/main" xmlns="" val="2326384349"/>
       </p:ext>
     </p:extLst>
   </p:cSld>
@@ -1780,7 +1895,8 @@
           <a:p>
             <a:fld id="{E7A90B90-E472-474B-A3B5-1621A993C8E6}" type="datetimeFigureOut">
               <a:rPr lang="en-US" smtClean="0"/>
-              <a:t>3/7/2014</a:t>
+              <a:pPr/>
+              <a:t>11/29/2015</a:t>
             </a:fld>
             <a:endParaRPr lang="en-US"/>
           </a:p>
@@ -1822,6 +1938,7 @@
           <a:p>
             <a:fld id="{BE42A63D-5A36-4046-B938-53CC6422AE08}" type="slidenum">
               <a:rPr lang="en-US" smtClean="0"/>
+              <a:pPr/>
               <a:t>‹#›</a:t>
             </a:fld>
             <a:endParaRPr lang="en-US"/>
@@ -1831,7 +1948,7 @@
     </p:spTree>
     <p:extLst>
       <p:ext uri="{BB962C8B-B14F-4D97-AF65-F5344CB8AC3E}">
-        <p14:creationId xmlns:p14="http://schemas.microsoft.com/office/powerpoint/2010/main" val="885233071"/>
+        <p14:creationId xmlns:p14="http://schemas.microsoft.com/office/powerpoint/2010/main" xmlns="" val="885233071"/>
       </p:ext>
     </p:extLst>
   </p:cSld>
@@ -2202,7 +2319,8 @@
           <a:p>
             <a:fld id="{E7A90B90-E472-474B-A3B5-1621A993C8E6}" type="datetimeFigureOut">
               <a:rPr lang="en-US" smtClean="0"/>
-              <a:t>3/7/2014</a:t>
+              <a:pPr/>
+              <a:t>11/29/2015</a:t>
             </a:fld>
             <a:endParaRPr lang="en-US"/>
           </a:p>
@@ -2244,6 +2362,7 @@
           <a:p>
             <a:fld id="{BE42A63D-5A36-4046-B938-53CC6422AE08}" type="slidenum">
               <a:rPr lang="en-US" smtClean="0"/>
+              <a:pPr/>
               <a:t>‹#›</a:t>
             </a:fld>
             <a:endParaRPr lang="en-US"/>
@@ -2253,7 +2372,7 @@
     </p:spTree>
     <p:extLst>
       <p:ext uri="{BB962C8B-B14F-4D97-AF65-F5344CB8AC3E}">
-        <p14:creationId xmlns:p14="http://schemas.microsoft.com/office/powerpoint/2010/main" val="1295669391"/>
+        <p14:creationId xmlns:p14="http://schemas.microsoft.com/office/powerpoint/2010/main" xmlns="" val="1295669391"/>
       </p:ext>
     </p:extLst>
   </p:cSld>
@@ -2320,7 +2439,8 @@
           <a:p>
             <a:fld id="{E7A90B90-E472-474B-A3B5-1621A993C8E6}" type="datetimeFigureOut">
               <a:rPr lang="en-US" smtClean="0"/>
-              <a:t>3/7/2014</a:t>
+              <a:pPr/>
+              <a:t>11/29/2015</a:t>
             </a:fld>
             <a:endParaRPr lang="en-US"/>
           </a:p>
@@ -2362,6 +2482,7 @@
           <a:p>
             <a:fld id="{BE42A63D-5A36-4046-B938-53CC6422AE08}" type="slidenum">
               <a:rPr lang="en-US" smtClean="0"/>
+              <a:pPr/>
               <a:t>‹#›</a:t>
             </a:fld>
             <a:endParaRPr lang="en-US"/>
@@ -2371,7 +2492,7 @@
     </p:spTree>
     <p:extLst>
       <p:ext uri="{BB962C8B-B14F-4D97-AF65-F5344CB8AC3E}">
-        <p14:creationId xmlns:p14="http://schemas.microsoft.com/office/powerpoint/2010/main" val="2892957379"/>
+        <p14:creationId xmlns:p14="http://schemas.microsoft.com/office/powerpoint/2010/main" xmlns="" val="2892957379"/>
       </p:ext>
     </p:extLst>
   </p:cSld>
@@ -2415,7 +2536,8 @@
           <a:p>
             <a:fld id="{E7A90B90-E472-474B-A3B5-1621A993C8E6}" type="datetimeFigureOut">
               <a:rPr lang="en-US" smtClean="0"/>
-              <a:t>3/7/2014</a:t>
+              <a:pPr/>
+              <a:t>11/29/2015</a:t>
             </a:fld>
             <a:endParaRPr lang="en-US"/>
           </a:p>
@@ -2457,6 +2579,7 @@
           <a:p>
             <a:fld id="{BE42A63D-5A36-4046-B938-53CC6422AE08}" type="slidenum">
               <a:rPr lang="en-US" smtClean="0"/>
+              <a:pPr/>
               <a:t>‹#›</a:t>
             </a:fld>
             <a:endParaRPr lang="en-US"/>
@@ -2466,7 +2589,7 @@
     </p:spTree>
     <p:extLst>
       <p:ext uri="{BB962C8B-B14F-4D97-AF65-F5344CB8AC3E}">
-        <p14:creationId xmlns:p14="http://schemas.microsoft.com/office/powerpoint/2010/main" val="2495813359"/>
+        <p14:creationId xmlns:p14="http://schemas.microsoft.com/office/powerpoint/2010/main" xmlns="" val="2495813359"/>
       </p:ext>
     </p:extLst>
   </p:cSld>
@@ -2692,7 +2815,8 @@
           <a:p>
             <a:fld id="{E7A90B90-E472-474B-A3B5-1621A993C8E6}" type="datetimeFigureOut">
               <a:rPr lang="en-US" smtClean="0"/>
-              <a:t>3/7/2014</a:t>
+              <a:pPr/>
+              <a:t>11/29/2015</a:t>
             </a:fld>
             <a:endParaRPr lang="en-US"/>
           </a:p>
@@ -2734,6 +2858,7 @@
           <a:p>
             <a:fld id="{BE42A63D-5A36-4046-B938-53CC6422AE08}" type="slidenum">
               <a:rPr lang="en-US" smtClean="0"/>
+              <a:pPr/>
               <a:t>‹#›</a:t>
             </a:fld>
             <a:endParaRPr lang="en-US"/>
@@ -2743,7 +2868,7 @@
     </p:spTree>
     <p:extLst>
       <p:ext uri="{BB962C8B-B14F-4D97-AF65-F5344CB8AC3E}">
-        <p14:creationId xmlns:p14="http://schemas.microsoft.com/office/powerpoint/2010/main" val="174699925"/>
+        <p14:creationId xmlns:p14="http://schemas.microsoft.com/office/powerpoint/2010/main" xmlns="" val="174699925"/>
       </p:ext>
     </p:extLst>
   </p:cSld>
@@ -2945,7 +3070,8 @@
           <a:p>
             <a:fld id="{E7A90B90-E472-474B-A3B5-1621A993C8E6}" type="datetimeFigureOut">
               <a:rPr lang="en-US" smtClean="0"/>
-              <a:t>3/7/2014</a:t>
+              <a:pPr/>
+              <a:t>11/29/2015</a:t>
             </a:fld>
             <a:endParaRPr lang="en-US"/>
           </a:p>
@@ -2987,6 +3113,7 @@
           <a:p>
             <a:fld id="{BE42A63D-5A36-4046-B938-53CC6422AE08}" type="slidenum">
               <a:rPr lang="en-US" smtClean="0"/>
+              <a:pPr/>
               <a:t>‹#›</a:t>
             </a:fld>
             <a:endParaRPr lang="en-US"/>
@@ -2996,7 +3123,7 @@
     </p:spTree>
     <p:extLst>
       <p:ext uri="{BB962C8B-B14F-4D97-AF65-F5344CB8AC3E}">
-        <p14:creationId xmlns:p14="http://schemas.microsoft.com/office/powerpoint/2010/main" val="420026453"/>
+        <p14:creationId xmlns:p14="http://schemas.microsoft.com/office/powerpoint/2010/main" xmlns="" val="420026453"/>
       </p:ext>
     </p:extLst>
   </p:cSld>
@@ -3158,7 +3285,8 @@
           <a:p>
             <a:fld id="{E7A90B90-E472-474B-A3B5-1621A993C8E6}" type="datetimeFigureOut">
               <a:rPr lang="en-US" smtClean="0"/>
-              <a:t>3/7/2014</a:t>
+              <a:pPr/>
+              <a:t>11/29/2015</a:t>
             </a:fld>
             <a:endParaRPr lang="en-US"/>
           </a:p>
@@ -3236,6 +3364,7 @@
           <a:p>
             <a:fld id="{BE42A63D-5A36-4046-B938-53CC6422AE08}" type="slidenum">
               <a:rPr lang="en-US" smtClean="0"/>
+              <a:pPr/>
               <a:t>‹#›</a:t>
             </a:fld>
             <a:endParaRPr lang="en-US"/>
@@ -3245,7 +3374,7 @@
     </p:spTree>
     <p:extLst>
       <p:ext uri="{BB962C8B-B14F-4D97-AF65-F5344CB8AC3E}">
-        <p14:creationId xmlns:p14="http://schemas.microsoft.com/office/powerpoint/2010/main" val="2793778716"/>
+        <p14:creationId xmlns:p14="http://schemas.microsoft.com/office/powerpoint/2010/main" xmlns="" val="2793778716"/>
       </p:ext>
     </p:extLst>
   </p:cSld>
@@ -3569,10 +3698,10 @@
           <p:nvPr/>
         </p:nvPicPr>
         <p:blipFill>
-          <a:blip r:embed="rId2">
+          <a:blip r:embed="rId3">
             <a:extLst>
               <a:ext uri="{28A0092B-C50C-407E-A947-70E740481C1C}">
-                <a14:useLocalDpi xmlns:a14="http://schemas.microsoft.com/office/drawing/2010/main" val="0"/>
+                <a14:useLocalDpi xmlns:a14="http://schemas.microsoft.com/office/drawing/2010/main" xmlns="" val="0"/>
               </a:ext>
             </a:extLst>
           </a:blip>
@@ -3592,7 +3721,7 @@
           <a:noFill/>
           <a:extLst>
             <a:ext uri="{909E8E84-426E-40DD-AFC4-6F175D3DCCD1}">
-              <a14:hiddenFill xmlns:a14="http://schemas.microsoft.com/office/drawing/2010/main">
+              <a14:hiddenFill xmlns:a14="http://schemas.microsoft.com/office/drawing/2010/main" xmlns="">
                 <a:solidFill>
                   <a:srgbClr val="FFFFFF"/>
                 </a:solidFill>
@@ -3604,7 +3733,7 @@
     </p:spTree>
     <p:extLst>
       <p:ext uri="{BB962C8B-B14F-4D97-AF65-F5344CB8AC3E}">
-        <p14:creationId xmlns:p14="http://schemas.microsoft.com/office/powerpoint/2010/main" val="310984695"/>
+        <p14:creationId xmlns:p14="http://schemas.microsoft.com/office/powerpoint/2010/main" xmlns="" val="310984695"/>
       </p:ext>
     </p:extLst>
   </p:cSld>
@@ -3778,7 +3907,7 @@
           <a:blip r:embed="rId3">
             <a:extLst>
               <a:ext uri="{28A0092B-C50C-407E-A947-70E740481C1C}">
-                <a14:useLocalDpi xmlns:a14="http://schemas.microsoft.com/office/drawing/2010/main" val="0"/>
+                <a14:useLocalDpi xmlns:a14="http://schemas.microsoft.com/office/drawing/2010/main" xmlns="" val="0"/>
               </a:ext>
             </a:extLst>
           </a:blip>
@@ -3798,7 +3927,7 @@
           <a:noFill/>
           <a:extLst>
             <a:ext uri="{909E8E84-426E-40DD-AFC4-6F175D3DCCD1}">
-              <a14:hiddenFill xmlns:a14="http://schemas.microsoft.com/office/drawing/2010/main">
+              <a14:hiddenFill xmlns:a14="http://schemas.microsoft.com/office/drawing/2010/main" xmlns="">
                 <a:solidFill>
                   <a:srgbClr val="FFFFFF"/>
                 </a:solidFill>
@@ -3810,7 +3939,7 @@
     </p:spTree>
     <p:extLst>
       <p:ext uri="{BB962C8B-B14F-4D97-AF65-F5344CB8AC3E}">
-        <p14:creationId xmlns:p14="http://schemas.microsoft.com/office/powerpoint/2010/main" val="416237675"/>
+        <p14:creationId xmlns:p14="http://schemas.microsoft.com/office/powerpoint/2010/main" xmlns="" val="416237675"/>
       </p:ext>
     </p:extLst>
   </p:cSld>

</xml_diff>